<commit_message>
adding backend to ppt
</commit_message>
<xml_diff>
--- a/Csapatmunka.pptx
+++ b/Csapatmunka.pptx
@@ -6,10 +6,10 @@
   </p:sldMasterIdLst>
   <p:sldIdLst>
     <p:sldId id="256" r:id="rId2"/>
-    <p:sldId id="257" r:id="rId3"/>
-    <p:sldId id="258" r:id="rId4"/>
-    <p:sldId id="259" r:id="rId5"/>
-    <p:sldId id="260" r:id="rId6"/>
+    <p:sldId id="258" r:id="rId3"/>
+    <p:sldId id="260" r:id="rId4"/>
+    <p:sldId id="257" r:id="rId5"/>
+    <p:sldId id="259" r:id="rId6"/>
     <p:sldId id="261" r:id="rId7"/>
   </p:sldIdLst>
   <p:sldSz cx="12192000" cy="6858000"/>
@@ -109,6 +109,11 @@
       </a:defRPr>
     </a:lvl9pPr>
   </p:defaultTextStyle>
+  <p:extLst>
+    <p:ext uri="{EFAFB233-063F-42B5-8137-9DF3F51BA10A}">
+      <p15:sldGuideLst xmlns:p15="http://schemas.microsoft.com/office/powerpoint/2012/main"/>
+    </p:ext>
+  </p:extLst>
 </p:presentation>
 </file>
 
@@ -1522,7 +1527,7 @@
             <a:fld id="{48A87A34-81AB-432B-8DAE-1953F412C126}" type="datetimeFigureOut">
               <a:rPr lang="en-US" dirty="0"/>
               <a:pPr/>
-              <a:t>11/25/2024</a:t>
+              <a:t>4/10/2025</a:t>
             </a:fld>
             <a:endParaRPr lang="en-US" dirty="0"/>
           </a:p>
@@ -2976,7 +2981,7 @@
           <a:p>
             <a:fld id="{48A87A34-81AB-432B-8DAE-1953F412C126}" type="datetimeFigureOut">
               <a:rPr lang="en-US" dirty="0"/>
-              <a:t>11/25/2024</a:t>
+              <a:t>4/10/2025</a:t>
             </a:fld>
             <a:endParaRPr lang="en-US" dirty="0"/>
           </a:p>
@@ -4424,7 +4429,7 @@
           <a:p>
             <a:fld id="{48A87A34-81AB-432B-8DAE-1953F412C126}" type="datetimeFigureOut">
               <a:rPr lang="en-US" dirty="0"/>
-              <a:t>11/25/2024</a:t>
+              <a:t>4/10/2025</a:t>
             </a:fld>
             <a:endParaRPr lang="en-US" dirty="0"/>
           </a:p>
@@ -5874,7 +5879,7 @@
           <a:p>
             <a:fld id="{48A87A34-81AB-432B-8DAE-1953F412C126}" type="datetimeFigureOut">
               <a:rPr lang="en-US" dirty="0"/>
-              <a:t>11/25/2024</a:t>
+              <a:t>4/10/2025</a:t>
             </a:fld>
             <a:endParaRPr lang="en-US" dirty="0"/>
           </a:p>
@@ -7377,7 +7382,7 @@
           <a:p>
             <a:fld id="{48A87A34-81AB-432B-8DAE-1953F412C126}" type="datetimeFigureOut">
               <a:rPr lang="en-US" dirty="0"/>
-              <a:t>11/25/2024</a:t>
+              <a:t>4/10/2025</a:t>
             </a:fld>
             <a:endParaRPr lang="en-US" dirty="0"/>
           </a:p>
@@ -8893,7 +8898,7 @@
           <a:p>
             <a:fld id="{48A87A34-81AB-432B-8DAE-1953F412C126}" type="datetimeFigureOut">
               <a:rPr lang="en-US" dirty="0"/>
-              <a:t>11/25/2024</a:t>
+              <a:t>4/10/2025</a:t>
             </a:fld>
             <a:endParaRPr lang="en-US" dirty="0"/>
           </a:p>
@@ -10553,7 +10558,7 @@
           <a:p>
             <a:fld id="{48A87A34-81AB-432B-8DAE-1953F412C126}" type="datetimeFigureOut">
               <a:rPr lang="en-US" dirty="0"/>
-              <a:t>11/25/2024</a:t>
+              <a:t>4/10/2025</a:t>
             </a:fld>
             <a:endParaRPr lang="en-US" dirty="0"/>
           </a:p>
@@ -11946,7 +11951,7 @@
           <a:p>
             <a:fld id="{48A87A34-81AB-432B-8DAE-1953F412C126}" type="datetimeFigureOut">
               <a:rPr lang="en-US" dirty="0"/>
-              <a:t>11/25/2024</a:t>
+              <a:t>4/10/2025</a:t>
             </a:fld>
             <a:endParaRPr lang="en-US" dirty="0"/>
           </a:p>
@@ -12041,7 +12046,7 @@
           <a:p>
             <a:fld id="{48A87A34-81AB-432B-8DAE-1953F412C126}" type="datetimeFigureOut">
               <a:rPr lang="en-US" dirty="0"/>
-              <a:t>11/25/2024</a:t>
+              <a:t>4/10/2025</a:t>
             </a:fld>
             <a:endParaRPr lang="en-US" dirty="0"/>
           </a:p>
@@ -13562,7 +13567,7 @@
           <a:p>
             <a:fld id="{48A87A34-81AB-432B-8DAE-1953F412C126}" type="datetimeFigureOut">
               <a:rPr lang="en-US" dirty="0"/>
-              <a:t>11/25/2024</a:t>
+              <a:t>4/10/2025</a:t>
             </a:fld>
             <a:endParaRPr lang="en-US" dirty="0"/>
           </a:p>
@@ -15093,7 +15098,7 @@
           <a:p>
             <a:fld id="{48A87A34-81AB-432B-8DAE-1953F412C126}" type="datetimeFigureOut">
               <a:rPr lang="en-US" dirty="0"/>
-              <a:t>11/25/2024</a:t>
+              <a:t>4/10/2025</a:t>
             </a:fld>
             <a:endParaRPr lang="en-US" dirty="0"/>
           </a:p>
@@ -15339,7 +15344,7 @@
             <a:fld id="{48A87A34-81AB-432B-8DAE-1953F412C126}" type="datetimeFigureOut">
               <a:rPr lang="en-US" dirty="0"/>
               <a:pPr/>
-              <a:t>11/25/2024</a:t>
+              <a:t>4/10/2025</a:t>
             </a:fld>
             <a:endParaRPr lang="en-US" dirty="0"/>
           </a:p>
@@ -15808,9 +15813,10 @@
           <a:lstStyle/>
           <a:p>
             <a:r>
-              <a:rPr lang="hu-HU" dirty="0"/>
-              <a:t>Csapatmunka</a:t>
+              <a:rPr lang="hu-HU" dirty="0" err="1"/>
+              <a:t>Vizsaremek</a:t>
             </a:r>
+            <a:endParaRPr lang="hu-HU" dirty="0"/>
           </a:p>
         </p:txBody>
       </p:sp>
@@ -15885,97 +15891,6 @@
           <p:cNvPr id="2" name="Cím 1">
             <a:extLst>
               <a:ext uri="{FF2B5EF4-FFF2-40B4-BE49-F238E27FC236}">
-                <a16:creationId xmlns:a16="http://schemas.microsoft.com/office/drawing/2014/main" id="{57235E52-002A-4F58-A131-A0E6DA3262E2}"/>
-              </a:ext>
-            </a:extLst>
-          </p:cNvPr>
-          <p:cNvSpPr>
-            <a:spLocks noGrp="1"/>
-          </p:cNvSpPr>
-          <p:nvPr>
-            <p:ph type="title"/>
-          </p:nvPr>
-        </p:nvSpPr>
-        <p:spPr/>
-        <p:txBody>
-          <a:bodyPr/>
-          <a:lstStyle/>
-          <a:p>
-            <a:r>
-              <a:rPr lang="hu-HU" dirty="0" err="1"/>
-              <a:t>Trello</a:t>
-            </a:r>
-            <a:r>
-              <a:rPr lang="hu-HU" dirty="0"/>
-              <a:t> Táblák</a:t>
-            </a:r>
-          </a:p>
-        </p:txBody>
-      </p:sp>
-      <p:pic>
-        <p:nvPicPr>
-          <p:cNvPr id="5" name="Tartalom helye 4">
-            <a:extLst>
-              <a:ext uri="{FF2B5EF4-FFF2-40B4-BE49-F238E27FC236}">
-                <a16:creationId xmlns:a16="http://schemas.microsoft.com/office/drawing/2014/main" id="{3C39FEFF-DE24-4F1D-BFB6-B4A9265417F8}"/>
-              </a:ext>
-            </a:extLst>
-          </p:cNvPr>
-          <p:cNvPicPr>
-            <a:picLocks noGrp="1" noChangeAspect="1"/>
-          </p:cNvPicPr>
-          <p:nvPr>
-            <p:ph idx="1"/>
-          </p:nvPr>
-        </p:nvPicPr>
-        <p:blipFill>
-          <a:blip r:embed="rId2"/>
-          <a:stretch>
-            <a:fillRect/>
-          </a:stretch>
-        </p:blipFill>
-        <p:spPr>
-          <a:xfrm>
-            <a:off x="5184032" y="866870"/>
-            <a:ext cx="6149873" cy="5121084"/>
-          </a:xfrm>
-        </p:spPr>
-      </p:pic>
-    </p:spTree>
-    <p:extLst>
-      <p:ext uri="{BB962C8B-B14F-4D97-AF65-F5344CB8AC3E}">
-        <p14:creationId xmlns:p14="http://schemas.microsoft.com/office/powerpoint/2010/main" val="515161992"/>
-      </p:ext>
-    </p:extLst>
-  </p:cSld>
-  <p:clrMapOvr>
-    <a:masterClrMapping/>
-  </p:clrMapOvr>
-</p:sld>
-</file>
-
-<file path=ppt/slides/slide3.xml><?xml version="1.0" encoding="utf-8"?>
-<p:sld xmlns:a="http://schemas.openxmlformats.org/drawingml/2006/main" xmlns:r="http://schemas.openxmlformats.org/officeDocument/2006/relationships" xmlns:p="http://schemas.openxmlformats.org/presentationml/2006/main">
-  <p:cSld>
-    <p:spTree>
-      <p:nvGrpSpPr>
-        <p:cNvPr id="1" name=""/>
-        <p:cNvGrpSpPr/>
-        <p:nvPr/>
-      </p:nvGrpSpPr>
-      <p:grpSpPr>
-        <a:xfrm>
-          <a:off x="0" y="0"/>
-          <a:ext cx="0" cy="0"/>
-          <a:chOff x="0" y="0"/>
-          <a:chExt cx="0" cy="0"/>
-        </a:xfrm>
-      </p:grpSpPr>
-      <p:sp>
-        <p:nvSpPr>
-          <p:cNvPr id="2" name="Cím 1">
-            <a:extLst>
-              <a:ext uri="{FF2B5EF4-FFF2-40B4-BE49-F238E27FC236}">
                 <a16:creationId xmlns:a16="http://schemas.microsoft.com/office/drawing/2014/main" id="{518CCA42-ACB4-4BBD-AB09-CA638A8CE320}"/>
               </a:ext>
             </a:extLst>
@@ -16078,6 +15993,94 @@
 </p:sld>
 </file>
 
+<file path=ppt/slides/slide3.xml><?xml version="1.0" encoding="utf-8"?>
+<p:sld xmlns:a="http://schemas.openxmlformats.org/drawingml/2006/main" xmlns:r="http://schemas.openxmlformats.org/officeDocument/2006/relationships" xmlns:p="http://schemas.openxmlformats.org/presentationml/2006/main">
+  <p:cSld>
+    <p:spTree>
+      <p:nvGrpSpPr>
+        <p:cNvPr id="1" name=""/>
+        <p:cNvGrpSpPr/>
+        <p:nvPr/>
+      </p:nvGrpSpPr>
+      <p:grpSpPr>
+        <a:xfrm>
+          <a:off x="0" y="0"/>
+          <a:ext cx="0" cy="0"/>
+          <a:chOff x="0" y="0"/>
+          <a:chExt cx="0" cy="0"/>
+        </a:xfrm>
+      </p:grpSpPr>
+      <p:sp>
+        <p:nvSpPr>
+          <p:cNvPr id="2" name="Cím 1">
+            <a:extLst>
+              <a:ext uri="{FF2B5EF4-FFF2-40B4-BE49-F238E27FC236}">
+                <a16:creationId xmlns:a16="http://schemas.microsoft.com/office/drawing/2014/main" id="{9AD1E31D-951E-472D-B5CB-1FCFF0E733F3}"/>
+              </a:ext>
+            </a:extLst>
+          </p:cNvPr>
+          <p:cNvSpPr>
+            <a:spLocks noGrp="1"/>
+          </p:cNvSpPr>
+          <p:nvPr>
+            <p:ph type="title"/>
+          </p:nvPr>
+        </p:nvSpPr>
+        <p:spPr/>
+        <p:txBody>
+          <a:bodyPr/>
+          <a:lstStyle/>
+          <a:p>
+            <a:r>
+              <a:rPr lang="hu-HU" dirty="0" err="1"/>
+              <a:t>Github</a:t>
+            </a:r>
+            <a:endParaRPr lang="hu-HU" dirty="0"/>
+          </a:p>
+        </p:txBody>
+      </p:sp>
+      <p:pic>
+        <p:nvPicPr>
+          <p:cNvPr id="5" name="Tartalom helye 4">
+            <a:extLst>
+              <a:ext uri="{FF2B5EF4-FFF2-40B4-BE49-F238E27FC236}">
+                <a16:creationId xmlns:a16="http://schemas.microsoft.com/office/drawing/2014/main" id="{89D40F5F-9B8A-4960-A32E-63EC095D332B}"/>
+              </a:ext>
+            </a:extLst>
+          </p:cNvPr>
+          <p:cNvPicPr>
+            <a:picLocks noGrp="1" noChangeAspect="1"/>
+          </p:cNvPicPr>
+          <p:nvPr>
+            <p:ph idx="1"/>
+          </p:nvPr>
+        </p:nvPicPr>
+        <p:blipFill>
+          <a:blip r:embed="rId2"/>
+          <a:stretch>
+            <a:fillRect/>
+          </a:stretch>
+        </p:blipFill>
+        <p:spPr>
+          <a:xfrm>
+            <a:off x="4687410" y="1205144"/>
+            <a:ext cx="7084381" cy="4447712"/>
+          </a:xfrm>
+        </p:spPr>
+      </p:pic>
+    </p:spTree>
+    <p:extLst>
+      <p:ext uri="{BB962C8B-B14F-4D97-AF65-F5344CB8AC3E}">
+        <p14:creationId xmlns:p14="http://schemas.microsoft.com/office/powerpoint/2010/main" val="3571903326"/>
+      </p:ext>
+    </p:extLst>
+  </p:cSld>
+  <p:clrMapOvr>
+    <a:masterClrMapping/>
+  </p:clrMapOvr>
+</p:sld>
+</file>
+
 <file path=ppt/slides/slide4.xml><?xml version="1.0" encoding="utf-8"?>
 <p:sld xmlns:a="http://schemas.openxmlformats.org/drawingml/2006/main" xmlns:r="http://schemas.openxmlformats.org/officeDocument/2006/relationships" xmlns:p="http://schemas.openxmlformats.org/presentationml/2006/main">
   <p:cSld>
@@ -16100,7 +16103,7 @@
           <p:cNvPr id="2" name="Cím 1">
             <a:extLst>
               <a:ext uri="{FF2B5EF4-FFF2-40B4-BE49-F238E27FC236}">
-                <a16:creationId xmlns:a16="http://schemas.microsoft.com/office/drawing/2014/main" id="{4999BA00-2743-4E08-AC84-DE983FC41293}"/>
+                <a16:creationId xmlns:a16="http://schemas.microsoft.com/office/drawing/2014/main" id="{57235E52-002A-4F58-A131-A0E6DA3262E2}"/>
               </a:ext>
             </a:extLst>
           </p:cNvPr>
@@ -16118,17 +16121,17 @@
           <a:p>
             <a:r>
               <a:rPr lang="hu-HU" dirty="0"/>
-              <a:t>Fő program táblája</a:t>
+              <a:t>Adatbázis</a:t>
             </a:r>
           </a:p>
         </p:txBody>
       </p:sp>
       <p:pic>
         <p:nvPicPr>
-          <p:cNvPr id="5" name="Tartalom helye 4">
+          <p:cNvPr id="6" name="Tartalom helye 5">
             <a:extLst>
               <a:ext uri="{FF2B5EF4-FFF2-40B4-BE49-F238E27FC236}">
-                <a16:creationId xmlns:a16="http://schemas.microsoft.com/office/drawing/2014/main" id="{C5C4E327-1CD8-4C9F-A722-E3BD40AB4339}"/>
+                <a16:creationId xmlns:a16="http://schemas.microsoft.com/office/drawing/2014/main" id="{36F21400-3B9A-4DCB-8B3A-5300EF8CF6D3}"/>
               </a:ext>
             </a:extLst>
           </p:cNvPr>
@@ -16147,15 +16150,15 @@
         </p:blipFill>
         <p:spPr>
           <a:xfrm>
-            <a:off x="5118100" y="984514"/>
-            <a:ext cx="6281738" cy="4885796"/>
+            <a:off x="4685211" y="1082685"/>
+            <a:ext cx="6618158" cy="4692630"/>
           </a:xfrm>
         </p:spPr>
       </p:pic>
     </p:spTree>
     <p:extLst>
       <p:ext uri="{BB962C8B-B14F-4D97-AF65-F5344CB8AC3E}">
-        <p14:creationId xmlns:p14="http://schemas.microsoft.com/office/powerpoint/2010/main" val="2458159748"/>
+        <p14:creationId xmlns:p14="http://schemas.microsoft.com/office/powerpoint/2010/main" val="515161992"/>
       </p:ext>
     </p:extLst>
   </p:cSld>
@@ -16187,7 +16190,7 @@
           <p:cNvPr id="2" name="Cím 1">
             <a:extLst>
               <a:ext uri="{FF2B5EF4-FFF2-40B4-BE49-F238E27FC236}">
-                <a16:creationId xmlns:a16="http://schemas.microsoft.com/office/drawing/2014/main" id="{9AD1E31D-951E-472D-B5CB-1FCFF0E733F3}"/>
+                <a16:creationId xmlns:a16="http://schemas.microsoft.com/office/drawing/2014/main" id="{4999BA00-2743-4E08-AC84-DE983FC41293}"/>
               </a:ext>
             </a:extLst>
           </p:cNvPr>
@@ -16204,19 +16207,12 @@
           <a:lstStyle/>
           <a:p>
             <a:r>
-              <a:rPr lang="hu-HU" dirty="0" err="1"/>
-              <a:t>Github</a:t>
-            </a:r>
-            <a:br>
               <a:rPr lang="hu-HU" dirty="0"/>
-            </a:br>
-            <a:r>
-              <a:rPr lang="hu-HU" dirty="0"/>
-              <a:t>Main </a:t>
+              <a:t>Backend </a:t>
             </a:r>
             <a:r>
               <a:rPr lang="hu-HU" dirty="0" err="1"/>
-              <a:t>Branch</a:t>
+              <a:t>Swagger</a:t>
             </a:r>
             <a:endParaRPr lang="hu-HU" dirty="0"/>
           </a:p>
@@ -16224,10 +16220,10 @@
       </p:sp>
       <p:pic>
         <p:nvPicPr>
-          <p:cNvPr id="5" name="Tartalom helye 4">
+          <p:cNvPr id="6" name="Tartalom helye 5">
             <a:extLst>
               <a:ext uri="{FF2B5EF4-FFF2-40B4-BE49-F238E27FC236}">
-                <a16:creationId xmlns:a16="http://schemas.microsoft.com/office/drawing/2014/main" id="{89D40F5F-9B8A-4960-A32E-63EC095D332B}"/>
+                <a16:creationId xmlns:a16="http://schemas.microsoft.com/office/drawing/2014/main" id="{6EB0D30F-CDF0-4FA9-93D9-5A916E776E03}"/>
               </a:ext>
             </a:extLst>
           </p:cNvPr>
@@ -16246,15 +16242,15 @@
         </p:blipFill>
         <p:spPr>
           <a:xfrm>
-            <a:off x="4927108" y="639193"/>
-            <a:ext cx="6871316" cy="5406500"/>
+            <a:off x="4621924" y="1580226"/>
+            <a:ext cx="7364194" cy="3524434"/>
           </a:xfrm>
         </p:spPr>
       </p:pic>
     </p:spTree>
     <p:extLst>
       <p:ext uri="{BB962C8B-B14F-4D97-AF65-F5344CB8AC3E}">
-        <p14:creationId xmlns:p14="http://schemas.microsoft.com/office/powerpoint/2010/main" val="3571903326"/>
+        <p14:creationId xmlns:p14="http://schemas.microsoft.com/office/powerpoint/2010/main" val="2458159748"/>
       </p:ext>
     </p:extLst>
   </p:cSld>
@@ -16304,25 +16300,17 @@
           <a:p>
             <a:r>
               <a:rPr lang="hu-HU" dirty="0"/>
-              <a:t>Mellék </a:t>
+              <a:t>Backend Kód</a:t>
             </a:r>
-            <a:br>
-              <a:rPr lang="hu-HU" dirty="0"/>
-            </a:br>
-            <a:r>
-              <a:rPr lang="hu-HU" dirty="0" err="1"/>
-              <a:t>Branchek</a:t>
-            </a:r>
-            <a:endParaRPr lang="hu-HU" dirty="0"/>
           </a:p>
         </p:txBody>
       </p:sp>
       <p:pic>
         <p:nvPicPr>
-          <p:cNvPr id="6" name="Tartalom helye 5">
+          <p:cNvPr id="19" name="Tartalom helye 18">
             <a:extLst>
               <a:ext uri="{FF2B5EF4-FFF2-40B4-BE49-F238E27FC236}">
-                <a16:creationId xmlns:a16="http://schemas.microsoft.com/office/drawing/2014/main" id="{6E14FBCE-71BF-491E-A7F4-65ACA78E7E82}"/>
+                <a16:creationId xmlns:a16="http://schemas.microsoft.com/office/drawing/2014/main" id="{4F3D449C-1F79-4A88-A7A8-7107C4525C55}"/>
               </a:ext>
             </a:extLst>
           </p:cNvPr>
@@ -16330,7 +16318,7 @@
             <a:picLocks noGrp="1" noChangeAspect="1"/>
           </p:cNvPicPr>
           <p:nvPr>
-            <p:ph sz="half" idx="1"/>
+            <p:ph idx="1"/>
           </p:nvPr>
         </p:nvPicPr>
         <p:blipFill>
@@ -16341,26 +16329,24 @@
         </p:blipFill>
         <p:spPr>
           <a:xfrm>
-            <a:off x="5204232" y="152774"/>
-            <a:ext cx="6311832" cy="4215039"/>
+            <a:off x="5223902" y="1116298"/>
+            <a:ext cx="5274169" cy="1422716"/>
           </a:xfrm>
         </p:spPr>
       </p:pic>
       <p:pic>
         <p:nvPicPr>
-          <p:cNvPr id="8" name="Tartalom helye 7">
+          <p:cNvPr id="21" name="Kép 20">
             <a:extLst>
               <a:ext uri="{FF2B5EF4-FFF2-40B4-BE49-F238E27FC236}">
-                <a16:creationId xmlns:a16="http://schemas.microsoft.com/office/drawing/2014/main" id="{86B36CBA-7476-4D69-ACFB-50B73F7A3968}"/>
+                <a16:creationId xmlns:a16="http://schemas.microsoft.com/office/drawing/2014/main" id="{AD4ECE4C-C45C-49EF-97D9-A5966834047E}"/>
               </a:ext>
             </a:extLst>
           </p:cNvPr>
           <p:cNvPicPr>
-            <a:picLocks noGrp="1" noChangeAspect="1"/>
+            <a:picLocks noChangeAspect="1"/>
           </p:cNvPicPr>
-          <p:nvPr>
-            <p:ph sz="half" idx="2"/>
-          </p:nvPr>
+          <p:nvPr/>
         </p:nvPicPr>
         <p:blipFill>
           <a:blip r:embed="rId3"/>
@@ -16370,9 +16356,12 @@
         </p:blipFill>
         <p:spPr>
           <a:xfrm>
-            <a:off x="4848513" y="3458594"/>
-            <a:ext cx="7154789" cy="2995472"/>
+            <a:off x="5219237" y="2675775"/>
+            <a:ext cx="5269504" cy="3286424"/>
           </a:xfrm>
+          <a:prstGeom prst="rect">
+            <a:avLst/>
+          </a:prstGeom>
         </p:spPr>
       </p:pic>
     </p:spTree>

</xml_diff>

<commit_message>
Adding Frontend to ppt
</commit_message>
<xml_diff>
--- a/Csapatmunka.pptx
+++ b/Csapatmunka.pptx
@@ -11,6 +11,9 @@
     <p:sldId id="257" r:id="rId5"/>
     <p:sldId id="259" r:id="rId6"/>
     <p:sldId id="261" r:id="rId7"/>
+    <p:sldId id="262" r:id="rId8"/>
+    <p:sldId id="264" r:id="rId9"/>
+    <p:sldId id="263" r:id="rId10"/>
   </p:sldIdLst>
   <p:sldSz cx="12192000" cy="6858000"/>
   <p:notesSz cx="6858000" cy="9144000"/>
@@ -15813,10 +15816,9 @@
           <a:lstStyle/>
           <a:p>
             <a:r>
-              <a:rPr lang="hu-HU" dirty="0" err="1"/>
-              <a:t>Vizsaremek</a:t>
+              <a:rPr lang="hu-HU" dirty="0"/>
+              <a:t>Vizsgaremek</a:t>
             </a:r>
-            <a:endParaRPr lang="hu-HU" dirty="0"/>
           </a:p>
         </p:txBody>
       </p:sp>
@@ -15843,7 +15845,7 @@
           <a:p>
             <a:r>
               <a:rPr lang="hu-HU" dirty="0"/>
-              <a:t>Nagy Levente, Veller Árpád, </a:t>
+              <a:t>Nagy Levente Ferenc, Veller Árpád, </a:t>
             </a:r>
             <a:r>
               <a:rPr lang="hu-HU" dirty="0" err="1"/>
@@ -16368,6 +16370,383 @@
     <p:extLst>
       <p:ext uri="{BB962C8B-B14F-4D97-AF65-F5344CB8AC3E}">
         <p14:creationId xmlns:p14="http://schemas.microsoft.com/office/powerpoint/2010/main" val="2309458760"/>
+      </p:ext>
+    </p:extLst>
+  </p:cSld>
+  <p:clrMapOvr>
+    <a:masterClrMapping/>
+  </p:clrMapOvr>
+</p:sld>
+</file>
+
+<file path=ppt/slides/slide7.xml><?xml version="1.0" encoding="utf-8"?>
+<p:sld xmlns:a="http://schemas.openxmlformats.org/drawingml/2006/main" xmlns:r="http://schemas.openxmlformats.org/officeDocument/2006/relationships" xmlns:p="http://schemas.openxmlformats.org/presentationml/2006/main">
+  <p:cSld>
+    <p:spTree>
+      <p:nvGrpSpPr>
+        <p:cNvPr id="1" name=""/>
+        <p:cNvGrpSpPr/>
+        <p:nvPr/>
+      </p:nvGrpSpPr>
+      <p:grpSpPr>
+        <a:xfrm>
+          <a:off x="0" y="0"/>
+          <a:ext cx="0" cy="0"/>
+          <a:chOff x="0" y="0"/>
+          <a:chExt cx="0" cy="0"/>
+        </a:xfrm>
+      </p:grpSpPr>
+      <p:sp>
+        <p:nvSpPr>
+          <p:cNvPr id="2" name="Cím 1">
+            <a:extLst>
+              <a:ext uri="{FF2B5EF4-FFF2-40B4-BE49-F238E27FC236}">
+                <a16:creationId xmlns:a16="http://schemas.microsoft.com/office/drawing/2014/main" id="{55D75CEB-F0BA-4120-9DA1-CC529F421166}"/>
+              </a:ext>
+            </a:extLst>
+          </p:cNvPr>
+          <p:cNvSpPr>
+            <a:spLocks noGrp="1"/>
+          </p:cNvSpPr>
+          <p:nvPr>
+            <p:ph type="title"/>
+          </p:nvPr>
+        </p:nvSpPr>
+        <p:spPr/>
+        <p:txBody>
+          <a:bodyPr/>
+          <a:lstStyle/>
+          <a:p>
+            <a:r>
+              <a:rPr lang="hu-HU" dirty="0"/>
+              <a:t>Frontend</a:t>
+            </a:r>
+            <a:br>
+              <a:rPr lang="hu-HU" dirty="0"/>
+            </a:br>
+            <a:r>
+              <a:rPr lang="hu-HU" dirty="0"/>
+              <a:t>App.js</a:t>
+            </a:r>
+          </a:p>
+        </p:txBody>
+      </p:sp>
+      <p:sp>
+        <p:nvSpPr>
+          <p:cNvPr id="3" name="Tartalom helye 2">
+            <a:extLst>
+              <a:ext uri="{FF2B5EF4-FFF2-40B4-BE49-F238E27FC236}">
+                <a16:creationId xmlns:a16="http://schemas.microsoft.com/office/drawing/2014/main" id="{C5AC8E73-5DB2-4DD3-B1AE-33AF85F1C03B}"/>
+              </a:ext>
+            </a:extLst>
+          </p:cNvPr>
+          <p:cNvSpPr>
+            <a:spLocks noGrp="1"/>
+          </p:cNvSpPr>
+          <p:nvPr>
+            <p:ph idx="1"/>
+          </p:nvPr>
+        </p:nvSpPr>
+        <p:spPr/>
+        <p:txBody>
+          <a:bodyPr/>
+          <a:lstStyle/>
+          <a:p>
+            <a:endParaRPr lang="hu-HU" dirty="0"/>
+          </a:p>
+        </p:txBody>
+      </p:sp>
+      <p:pic>
+        <p:nvPicPr>
+          <p:cNvPr id="4" name="Kép 3">
+            <a:extLst>
+              <a:ext uri="{FF2B5EF4-FFF2-40B4-BE49-F238E27FC236}">
+                <a16:creationId xmlns:a16="http://schemas.microsoft.com/office/drawing/2014/main" id="{D16FB915-6121-46C4-87A5-BF05E36ABB4A}"/>
+              </a:ext>
+            </a:extLst>
+          </p:cNvPr>
+          <p:cNvPicPr>
+            <a:picLocks noChangeAspect="1"/>
+          </p:cNvPicPr>
+          <p:nvPr/>
+        </p:nvPicPr>
+        <p:blipFill>
+          <a:blip r:embed="rId2"/>
+          <a:stretch>
+            <a:fillRect/>
+          </a:stretch>
+        </p:blipFill>
+        <p:spPr>
+          <a:xfrm>
+            <a:off x="4806434" y="1641308"/>
+            <a:ext cx="6905897" cy="3873675"/>
+          </a:xfrm>
+          <a:prstGeom prst="rect">
+            <a:avLst/>
+          </a:prstGeom>
+        </p:spPr>
+      </p:pic>
+    </p:spTree>
+    <p:extLst>
+      <p:ext uri="{BB962C8B-B14F-4D97-AF65-F5344CB8AC3E}">
+        <p14:creationId xmlns:p14="http://schemas.microsoft.com/office/powerpoint/2010/main" val="1301507897"/>
+      </p:ext>
+    </p:extLst>
+  </p:cSld>
+  <p:clrMapOvr>
+    <a:masterClrMapping/>
+  </p:clrMapOvr>
+</p:sld>
+</file>
+
+<file path=ppt/slides/slide8.xml><?xml version="1.0" encoding="utf-8"?>
+<p:sld xmlns:a="http://schemas.openxmlformats.org/drawingml/2006/main" xmlns:r="http://schemas.openxmlformats.org/officeDocument/2006/relationships" xmlns:p="http://schemas.openxmlformats.org/presentationml/2006/main">
+  <p:cSld>
+    <p:spTree>
+      <p:nvGrpSpPr>
+        <p:cNvPr id="1" name=""/>
+        <p:cNvGrpSpPr/>
+        <p:nvPr/>
+      </p:nvGrpSpPr>
+      <p:grpSpPr>
+        <a:xfrm>
+          <a:off x="0" y="0"/>
+          <a:ext cx="0" cy="0"/>
+          <a:chOff x="0" y="0"/>
+          <a:chExt cx="0" cy="0"/>
+        </a:xfrm>
+      </p:grpSpPr>
+      <p:sp>
+        <p:nvSpPr>
+          <p:cNvPr id="2" name="Cím 1">
+            <a:extLst>
+              <a:ext uri="{FF2B5EF4-FFF2-40B4-BE49-F238E27FC236}">
+                <a16:creationId xmlns:a16="http://schemas.microsoft.com/office/drawing/2014/main" id="{1D8C0A6B-FEF5-4E33-8B16-205DC80FD10F}"/>
+              </a:ext>
+            </a:extLst>
+          </p:cNvPr>
+          <p:cNvSpPr>
+            <a:spLocks noGrp="1"/>
+          </p:cNvSpPr>
+          <p:nvPr>
+            <p:ph type="title"/>
+          </p:nvPr>
+        </p:nvSpPr>
+        <p:spPr/>
+        <p:txBody>
+          <a:bodyPr>
+            <a:normAutofit/>
+          </a:bodyPr>
+          <a:lstStyle/>
+          <a:p>
+            <a:r>
+              <a:rPr lang="hu-HU" dirty="0"/>
+              <a:t>Frontend</a:t>
+            </a:r>
+            <a:br>
+              <a:rPr lang="hu-HU" dirty="0"/>
+            </a:br>
+            <a:r>
+              <a:rPr lang="hu-HU" dirty="0"/>
+              <a:t>App.js</a:t>
+            </a:r>
+            <a:br>
+              <a:rPr lang="hu-HU" dirty="0"/>
+            </a:br>
+            <a:r>
+              <a:rPr lang="hu-HU" dirty="0" err="1"/>
+              <a:t>Token</a:t>
+            </a:r>
+            <a:endParaRPr lang="hu-HU" dirty="0"/>
+          </a:p>
+        </p:txBody>
+      </p:sp>
+      <p:sp>
+        <p:nvSpPr>
+          <p:cNvPr id="3" name="Tartalom helye 2">
+            <a:extLst>
+              <a:ext uri="{FF2B5EF4-FFF2-40B4-BE49-F238E27FC236}">
+                <a16:creationId xmlns:a16="http://schemas.microsoft.com/office/drawing/2014/main" id="{1C3AC846-43CA-4C33-8424-095EF10DB08F}"/>
+              </a:ext>
+            </a:extLst>
+          </p:cNvPr>
+          <p:cNvSpPr>
+            <a:spLocks noGrp="1"/>
+          </p:cNvSpPr>
+          <p:nvPr>
+            <p:ph idx="1"/>
+          </p:nvPr>
+        </p:nvSpPr>
+        <p:spPr/>
+        <p:txBody>
+          <a:bodyPr/>
+          <a:lstStyle/>
+          <a:p>
+            <a:endParaRPr lang="hu-HU"/>
+          </a:p>
+        </p:txBody>
+      </p:sp>
+      <p:pic>
+        <p:nvPicPr>
+          <p:cNvPr id="4" name="Kép 3">
+            <a:extLst>
+              <a:ext uri="{FF2B5EF4-FFF2-40B4-BE49-F238E27FC236}">
+                <a16:creationId xmlns:a16="http://schemas.microsoft.com/office/drawing/2014/main" id="{17980A8C-B0C5-4B93-902B-DC20354BE470}"/>
+              </a:ext>
+            </a:extLst>
+          </p:cNvPr>
+          <p:cNvPicPr>
+            <a:picLocks noChangeAspect="1"/>
+          </p:cNvPicPr>
+          <p:nvPr/>
+        </p:nvPicPr>
+        <p:blipFill>
+          <a:blip r:embed="rId2"/>
+          <a:stretch>
+            <a:fillRect/>
+          </a:stretch>
+        </p:blipFill>
+        <p:spPr>
+          <a:xfrm>
+            <a:off x="5525069" y="4330430"/>
+            <a:ext cx="5468626" cy="2434935"/>
+          </a:xfrm>
+          <a:prstGeom prst="rect">
+            <a:avLst/>
+          </a:prstGeom>
+        </p:spPr>
+      </p:pic>
+      <p:pic>
+        <p:nvPicPr>
+          <p:cNvPr id="5" name="Kép 4">
+            <a:extLst>
+              <a:ext uri="{FF2B5EF4-FFF2-40B4-BE49-F238E27FC236}">
+                <a16:creationId xmlns:a16="http://schemas.microsoft.com/office/drawing/2014/main" id="{054DD4BA-9309-4C4D-8371-B308C5735D28}"/>
+              </a:ext>
+            </a:extLst>
+          </p:cNvPr>
+          <p:cNvPicPr>
+            <a:picLocks noChangeAspect="1"/>
+          </p:cNvPicPr>
+          <p:nvPr/>
+        </p:nvPicPr>
+        <p:blipFill>
+          <a:blip r:embed="rId3"/>
+          <a:stretch>
+            <a:fillRect/>
+          </a:stretch>
+        </p:blipFill>
+        <p:spPr>
+          <a:xfrm>
+            <a:off x="5118445" y="458853"/>
+            <a:ext cx="6281873" cy="3782143"/>
+          </a:xfrm>
+          <a:prstGeom prst="rect">
+            <a:avLst/>
+          </a:prstGeom>
+        </p:spPr>
+      </p:pic>
+    </p:spTree>
+    <p:extLst>
+      <p:ext uri="{BB962C8B-B14F-4D97-AF65-F5344CB8AC3E}">
+        <p14:creationId xmlns:p14="http://schemas.microsoft.com/office/powerpoint/2010/main" val="3028101289"/>
+      </p:ext>
+    </p:extLst>
+  </p:cSld>
+  <p:clrMapOvr>
+    <a:masterClrMapping/>
+  </p:clrMapOvr>
+</p:sld>
+</file>
+
+<file path=ppt/slides/slide9.xml><?xml version="1.0" encoding="utf-8"?>
+<p:sld xmlns:a="http://schemas.openxmlformats.org/drawingml/2006/main" xmlns:r="http://schemas.openxmlformats.org/officeDocument/2006/relationships" xmlns:p="http://schemas.openxmlformats.org/presentationml/2006/main">
+  <p:cSld>
+    <p:spTree>
+      <p:nvGrpSpPr>
+        <p:cNvPr id="1" name=""/>
+        <p:cNvGrpSpPr/>
+        <p:nvPr/>
+      </p:nvGrpSpPr>
+      <p:grpSpPr>
+        <a:xfrm>
+          <a:off x="0" y="0"/>
+          <a:ext cx="0" cy="0"/>
+          <a:chOff x="0" y="0"/>
+          <a:chExt cx="0" cy="0"/>
+        </a:xfrm>
+      </p:grpSpPr>
+      <p:sp>
+        <p:nvSpPr>
+          <p:cNvPr id="2" name="Cím 1">
+            <a:extLst>
+              <a:ext uri="{FF2B5EF4-FFF2-40B4-BE49-F238E27FC236}">
+                <a16:creationId xmlns:a16="http://schemas.microsoft.com/office/drawing/2014/main" id="{11729D03-B33E-45F8-A052-C14011F244DB}"/>
+              </a:ext>
+            </a:extLst>
+          </p:cNvPr>
+          <p:cNvSpPr>
+            <a:spLocks noGrp="1"/>
+          </p:cNvSpPr>
+          <p:nvPr>
+            <p:ph type="title"/>
+          </p:nvPr>
+        </p:nvSpPr>
+        <p:spPr/>
+        <p:txBody>
+          <a:bodyPr/>
+          <a:lstStyle/>
+          <a:p>
+            <a:r>
+              <a:rPr lang="hu-HU" dirty="0"/>
+              <a:t>Frontend</a:t>
+            </a:r>
+            <a:br>
+              <a:rPr lang="hu-HU" dirty="0"/>
+            </a:br>
+            <a:r>
+              <a:rPr lang="hu-HU" dirty="0"/>
+              <a:t>Szerkezet</a:t>
+            </a:r>
+          </a:p>
+        </p:txBody>
+      </p:sp>
+      <p:pic>
+        <p:nvPicPr>
+          <p:cNvPr id="4" name="Tartalom helye 3">
+            <a:extLst>
+              <a:ext uri="{FF2B5EF4-FFF2-40B4-BE49-F238E27FC236}">
+                <a16:creationId xmlns:a16="http://schemas.microsoft.com/office/drawing/2014/main" id="{CA432638-2F13-469B-9060-1519D1D595D6}"/>
+              </a:ext>
+            </a:extLst>
+          </p:cNvPr>
+          <p:cNvPicPr>
+            <a:picLocks noGrp="1" noChangeAspect="1"/>
+          </p:cNvPicPr>
+          <p:nvPr>
+            <p:ph idx="1"/>
+          </p:nvPr>
+        </p:nvPicPr>
+        <p:blipFill>
+          <a:blip r:embed="rId2"/>
+          <a:stretch>
+            <a:fillRect/>
+          </a:stretch>
+        </p:blipFill>
+        <p:spPr>
+          <a:xfrm>
+            <a:off x="7804392" y="172189"/>
+            <a:ext cx="1886770" cy="6513622"/>
+          </a:xfrm>
+          <a:prstGeom prst="rect">
+            <a:avLst/>
+          </a:prstGeom>
+        </p:spPr>
+      </p:pic>
+    </p:spTree>
+    <p:extLst>
+      <p:ext uri="{BB962C8B-B14F-4D97-AF65-F5344CB8AC3E}">
+        <p14:creationId xmlns:p14="http://schemas.microsoft.com/office/powerpoint/2010/main" val="978279483"/>
       </p:ext>
     </p:extLst>
   </p:cSld>

</xml_diff>